<commit_message>
modeling/OODM: update example diagram to add inheritance
</commit_message>
<xml_diff>
--- a/diagrams/modelling/modellingStructures/objectOrientedDomainModels/snakesAndLadders.pptx
+++ b/diagrams/modelling/modellingStructures/objectOrientedDomainModels/snakesAndLadders.pptx
@@ -104,6 +104,22 @@
       </a:defRPr>
     </a:lvl9pPr>
   </p:defaultTextStyle>
+  <p:extLst>
+    <p:ext uri="{EFAFB233-063F-42B5-8137-9DF3F51BA10A}">
+      <p15:sldGuideLst xmlns:p15="http://schemas.microsoft.com/office/powerpoint/2012/main">
+        <p15:guide id="1" orient="horz" pos="2160">
+          <p15:clr>
+            <a:srgbClr val="A4A3A4"/>
+          </p15:clr>
+        </p15:guide>
+        <p15:guide id="2" pos="2880">
+          <p15:clr>
+            <a:srgbClr val="A4A3A4"/>
+          </p15:clr>
+        </p15:guide>
+      </p15:sldGuideLst>
+    </p:ext>
+  </p:extLst>
 </p:presentation>
 </file>
 
@@ -288,7 +304,7 @@
           <a:p>
             <a:fld id="{ED88E258-B0CF-4D00-9DD0-47F6C19C998A}" type="datetimeFigureOut">
               <a:rPr lang="en-SG" smtClean="0"/>
-              <a:t>6/7/2017</a:t>
+              <a:t>24/10/2018</a:t>
             </a:fld>
             <a:endParaRPr lang="en-SG"/>
           </a:p>
@@ -458,7 +474,7 @@
           <a:p>
             <a:fld id="{ED88E258-B0CF-4D00-9DD0-47F6C19C998A}" type="datetimeFigureOut">
               <a:rPr lang="en-SG" smtClean="0"/>
-              <a:t>6/7/2017</a:t>
+              <a:t>24/10/2018</a:t>
             </a:fld>
             <a:endParaRPr lang="en-SG"/>
           </a:p>
@@ -638,7 +654,7 @@
           <a:p>
             <a:fld id="{ED88E258-B0CF-4D00-9DD0-47F6C19C998A}" type="datetimeFigureOut">
               <a:rPr lang="en-SG" smtClean="0"/>
-              <a:t>6/7/2017</a:t>
+              <a:t>24/10/2018</a:t>
             </a:fld>
             <a:endParaRPr lang="en-SG"/>
           </a:p>
@@ -808,7 +824,7 @@
           <a:p>
             <a:fld id="{ED88E258-B0CF-4D00-9DD0-47F6C19C998A}" type="datetimeFigureOut">
               <a:rPr lang="en-SG" smtClean="0"/>
-              <a:t>6/7/2017</a:t>
+              <a:t>24/10/2018</a:t>
             </a:fld>
             <a:endParaRPr lang="en-SG"/>
           </a:p>
@@ -1054,7 +1070,7 @@
           <a:p>
             <a:fld id="{ED88E258-B0CF-4D00-9DD0-47F6C19C998A}" type="datetimeFigureOut">
               <a:rPr lang="en-SG" smtClean="0"/>
-              <a:t>6/7/2017</a:t>
+              <a:t>24/10/2018</a:t>
             </a:fld>
             <a:endParaRPr lang="en-SG"/>
           </a:p>
@@ -1342,7 +1358,7 @@
           <a:p>
             <a:fld id="{ED88E258-B0CF-4D00-9DD0-47F6C19C998A}" type="datetimeFigureOut">
               <a:rPr lang="en-SG" smtClean="0"/>
-              <a:t>6/7/2017</a:t>
+              <a:t>24/10/2018</a:t>
             </a:fld>
             <a:endParaRPr lang="en-SG"/>
           </a:p>
@@ -1764,7 +1780,7 @@
           <a:p>
             <a:fld id="{ED88E258-B0CF-4D00-9DD0-47F6C19C998A}" type="datetimeFigureOut">
               <a:rPr lang="en-SG" smtClean="0"/>
-              <a:t>6/7/2017</a:t>
+              <a:t>24/10/2018</a:t>
             </a:fld>
             <a:endParaRPr lang="en-SG"/>
           </a:p>
@@ -1882,7 +1898,7 @@
           <a:p>
             <a:fld id="{ED88E258-B0CF-4D00-9DD0-47F6C19C998A}" type="datetimeFigureOut">
               <a:rPr lang="en-SG" smtClean="0"/>
-              <a:t>6/7/2017</a:t>
+              <a:t>24/10/2018</a:t>
             </a:fld>
             <a:endParaRPr lang="en-SG"/>
           </a:p>
@@ -1977,7 +1993,7 @@
           <a:p>
             <a:fld id="{ED88E258-B0CF-4D00-9DD0-47F6C19C998A}" type="datetimeFigureOut">
               <a:rPr lang="en-SG" smtClean="0"/>
-              <a:t>6/7/2017</a:t>
+              <a:t>24/10/2018</a:t>
             </a:fld>
             <a:endParaRPr lang="en-SG"/>
           </a:p>
@@ -2254,7 +2270,7 @@
           <a:p>
             <a:fld id="{ED88E258-B0CF-4D00-9DD0-47F6C19C998A}" type="datetimeFigureOut">
               <a:rPr lang="en-SG" smtClean="0"/>
-              <a:t>6/7/2017</a:t>
+              <a:t>24/10/2018</a:t>
             </a:fld>
             <a:endParaRPr lang="en-SG"/>
           </a:p>
@@ -2507,7 +2523,7 @@
           <a:p>
             <a:fld id="{ED88E258-B0CF-4D00-9DD0-47F6C19C998A}" type="datetimeFigureOut">
               <a:rPr lang="en-SG" smtClean="0"/>
-              <a:t>6/7/2017</a:t>
+              <a:t>24/10/2018</a:t>
             </a:fld>
             <a:endParaRPr lang="en-SG"/>
           </a:p>
@@ -2720,7 +2736,7 @@
           <a:p>
             <a:fld id="{ED88E258-B0CF-4D00-9DD0-47F6C19C998A}" type="datetimeFigureOut">
               <a:rPr lang="en-SG" smtClean="0"/>
-              <a:t>6/7/2017</a:t>
+              <a:t>24/10/2018</a:t>
             </a:fld>
             <a:endParaRPr lang="en-SG"/>
           </a:p>
@@ -3103,7 +3119,7 @@
         </p:nvSpPr>
         <p:spPr>
           <a:xfrm>
-            <a:off x="152400" y="2156936"/>
+            <a:off x="1001168" y="1650176"/>
             <a:ext cx="2514600" cy="369332"/>
           </a:xfrm>
           <a:prstGeom prst="rect">
@@ -3210,7 +3226,7 @@
         </p:nvSpPr>
         <p:spPr>
           <a:xfrm>
-            <a:off x="4343400" y="2690336"/>
+            <a:off x="5192168" y="2183576"/>
             <a:ext cx="1143000" cy="369332"/>
           </a:xfrm>
           <a:prstGeom prst="rect">
@@ -3303,7 +3319,7 @@
         </p:nvCxnSpPr>
         <p:spPr>
           <a:xfrm>
-            <a:off x="2667000" y="2341602"/>
+            <a:off x="3515768" y="1834842"/>
             <a:ext cx="2247900" cy="348734"/>
           </a:xfrm>
           <a:prstGeom prst="bentConnector2">
@@ -3327,7 +3343,7 @@
         </p:nvSpPr>
         <p:spPr>
           <a:xfrm>
-            <a:off x="2667000" y="1916668"/>
+            <a:off x="3515768" y="1409908"/>
             <a:ext cx="1066800" cy="369332"/>
           </a:xfrm>
           <a:prstGeom prst="rect">
@@ -3420,7 +3436,7 @@
         </p:nvSpPr>
         <p:spPr>
           <a:xfrm>
-            <a:off x="2286000" y="3135868"/>
+            <a:off x="3134768" y="2629108"/>
             <a:ext cx="1143000" cy="369332"/>
           </a:xfrm>
           <a:prstGeom prst="rect">
@@ -3510,7 +3526,7 @@
         </p:nvSpPr>
         <p:spPr>
           <a:xfrm>
-            <a:off x="838200" y="3821668"/>
+            <a:off x="1686968" y="3314908"/>
             <a:ext cx="1143000" cy="369332"/>
           </a:xfrm>
           <a:prstGeom prst="rect">
@@ -3617,7 +3633,7 @@
         </p:nvSpPr>
         <p:spPr>
           <a:xfrm>
-            <a:off x="2286000" y="4355068"/>
+            <a:off x="3134768" y="3848308"/>
             <a:ext cx="1143000" cy="369332"/>
           </a:xfrm>
           <a:prstGeom prst="rect">
@@ -3718,7 +3734,7 @@
         </p:nvSpPr>
         <p:spPr>
           <a:xfrm>
-            <a:off x="6629400" y="2690336"/>
+            <a:off x="7478168" y="2183576"/>
             <a:ext cx="1143000" cy="369332"/>
           </a:xfrm>
           <a:prstGeom prst="rect">
@@ -3811,7 +3827,7 @@
         </p:nvCxnSpPr>
         <p:spPr>
           <a:xfrm>
-            <a:off x="5486400" y="2875002"/>
+            <a:off x="6335168" y="2368242"/>
             <a:ext cx="1143000" cy="1588"/>
           </a:xfrm>
           <a:prstGeom prst="bentConnector3">
@@ -3840,7 +3856,7 @@
         </p:nvCxnSpPr>
         <p:spPr>
           <a:xfrm rot="5400000" flipH="1" flipV="1">
-            <a:off x="3470017" y="2262485"/>
+            <a:off x="4318785" y="1755725"/>
             <a:ext cx="260866" cy="1485900"/>
           </a:xfrm>
           <a:prstGeom prst="bentConnector2">
@@ -3867,7 +3883,7 @@
         </p:nvCxnSpPr>
         <p:spPr>
           <a:xfrm rot="5400000">
-            <a:off x="762000" y="3173968"/>
+            <a:off x="1610768" y="2667208"/>
             <a:ext cx="1295400" cy="1588"/>
           </a:xfrm>
           <a:prstGeom prst="bentConnector3">
@@ -3896,7 +3912,7 @@
         </p:nvCxnSpPr>
         <p:spPr>
           <a:xfrm rot="5400000" flipH="1" flipV="1">
-            <a:off x="2432566" y="3930134"/>
+            <a:off x="3281334" y="3423374"/>
             <a:ext cx="849868" cy="1588"/>
           </a:xfrm>
           <a:prstGeom prst="bentConnector3">
@@ -3925,7 +3941,7 @@
         </p:nvCxnSpPr>
         <p:spPr>
           <a:xfrm rot="16200000" flipH="1">
-            <a:off x="1673483" y="3927217"/>
+            <a:off x="2522251" y="3420457"/>
             <a:ext cx="348734" cy="876300"/>
           </a:xfrm>
           <a:prstGeom prst="bentConnector2">
@@ -3949,7 +3965,7 @@
         </p:nvSpPr>
         <p:spPr>
           <a:xfrm>
-            <a:off x="2286000" y="4724400"/>
+            <a:off x="3134768" y="4217640"/>
             <a:ext cx="1143000" cy="369332"/>
           </a:xfrm>
           <a:prstGeom prst="rect">
@@ -4050,7 +4066,7 @@
         </p:nvSpPr>
         <p:spPr>
           <a:xfrm>
-            <a:off x="3124200" y="2526268"/>
+            <a:off x="3972968" y="2019508"/>
             <a:ext cx="1066800" cy="369332"/>
           </a:xfrm>
           <a:prstGeom prst="rect">
@@ -4119,7 +4135,7 @@
         </p:nvSpPr>
         <p:spPr>
           <a:xfrm rot="16200000">
-            <a:off x="413266" y="2951202"/>
+            <a:off x="1262034" y="2444442"/>
             <a:ext cx="1371600" cy="369332"/>
           </a:xfrm>
           <a:prstGeom prst="rect">
@@ -4188,7 +4204,7 @@
         </p:nvSpPr>
         <p:spPr>
           <a:xfrm>
-            <a:off x="1752600" y="4495800"/>
+            <a:off x="2601368" y="3989040"/>
             <a:ext cx="533400" cy="369332"/>
           </a:xfrm>
           <a:prstGeom prst="rect">
@@ -4242,7 +4258,7 @@
         </p:nvSpPr>
         <p:spPr>
           <a:xfrm>
-            <a:off x="5562600" y="2526268"/>
+            <a:off x="6411368" y="2019508"/>
             <a:ext cx="914400" cy="369332"/>
           </a:xfrm>
           <a:prstGeom prst="rect">
@@ -4311,7 +4327,7 @@
         </p:nvSpPr>
         <p:spPr>
           <a:xfrm rot="16200000">
-            <a:off x="2203966" y="3751302"/>
+            <a:off x="3052734" y="3244542"/>
             <a:ext cx="838200" cy="369332"/>
           </a:xfrm>
           <a:prstGeom prst="rect">
@@ -4380,7 +4396,7 @@
         </p:nvSpPr>
         <p:spPr>
           <a:xfrm>
-            <a:off x="4343400" y="2297668"/>
+            <a:off x="5192168" y="1790908"/>
             <a:ext cx="609600" cy="369332"/>
           </a:xfrm>
           <a:prstGeom prst="rect">
@@ -4449,7 +4465,7 @@
         </p:nvSpPr>
         <p:spPr>
           <a:xfrm>
-            <a:off x="2514600" y="2754868"/>
+            <a:off x="3363368" y="2248108"/>
             <a:ext cx="381000" cy="381000"/>
           </a:xfrm>
           <a:prstGeom prst="rect">
@@ -4518,7 +4534,7 @@
         </p:nvSpPr>
         <p:spPr>
           <a:xfrm>
-            <a:off x="2816472" y="3467044"/>
+            <a:off x="3665240" y="2960284"/>
             <a:ext cx="381000" cy="381000"/>
           </a:xfrm>
           <a:prstGeom prst="rect">
@@ -4587,8 +4603,8 @@
         </p:nvSpPr>
         <p:spPr>
           <a:xfrm>
-            <a:off x="2283072" y="6096000"/>
-            <a:ext cx="1143000" cy="369332"/>
+            <a:off x="3074690" y="5608071"/>
+            <a:ext cx="1257300" cy="331670"/>
           </a:xfrm>
           <a:prstGeom prst="rect">
             <a:avLst/>
@@ -4643,13 +4659,13 @@
               <a:defRPr/>
             </a:pPr>
             <a:r>
-              <a:rPr lang="en-US" kern="0" dirty="0" smtClean="0">
+              <a:rPr lang="en-US" kern="0" dirty="0" err="1" smtClean="0">
                 <a:solidFill>
                   <a:sysClr val="windowText" lastClr="000000"/>
                 </a:solidFill>
                 <a:latin typeface="Calibri" pitchFamily="34" charset="0"/>
               </a:rPr>
-              <a:t>Snake</a:t>
+              <a:t>AutoMover</a:t>
             </a:r>
             <a:endParaRPr lang="en-US" kern="0" dirty="0">
               <a:solidFill>
@@ -4668,7 +4684,7 @@
         </p:nvCxnSpPr>
         <p:spPr>
           <a:xfrm rot="5400000" flipH="1" flipV="1">
-            <a:off x="1897702" y="5593402"/>
+            <a:off x="2746470" y="5086642"/>
             <a:ext cx="1002268" cy="2928"/>
           </a:xfrm>
           <a:prstGeom prst="bentConnector3">
@@ -4705,8 +4721,8 @@
         </p:nvSpPr>
         <p:spPr>
           <a:xfrm rot="16200000">
-            <a:off x="2181999" y="5514201"/>
-            <a:ext cx="729734" cy="369332"/>
+            <a:off x="2828443" y="4886563"/>
+            <a:ext cx="1099067" cy="338554"/>
           </a:xfrm>
           <a:prstGeom prst="rect">
             <a:avLst/>
@@ -4737,7 +4753,7 @@
               <a:defRPr/>
             </a:pPr>
             <a:r>
-              <a:rPr kumimoji="0" lang="en-US" sz="1800" b="0" i="0" u="none" strike="noStrike" kern="0" cap="none" spc="0" normalizeH="0" baseline="0" noProof="0" dirty="0" smtClean="0">
+              <a:rPr kumimoji="0" lang="en-US" sz="1600" b="0" i="0" u="none" strike="noStrike" kern="0" cap="none" spc="0" normalizeH="0" baseline="0" noProof="0" dirty="0" smtClean="0">
                 <a:ln>
                   <a:noFill/>
                 </a:ln>
@@ -4746,9 +4762,9 @@
                 <a:uFillTx/>
                 <a:latin typeface="Calibri" pitchFamily="34" charset="0"/>
               </a:rPr>
-              <a:t>tail in</a:t>
-            </a:r>
-            <a:endParaRPr kumimoji="0" lang="en-US" sz="1800" b="0" i="0" u="none" strike="noStrike" kern="0" cap="none" spc="0" normalizeH="0" baseline="0" noProof="0" dirty="0">
+              <a:t>starts in</a:t>
+            </a:r>
+            <a:endParaRPr kumimoji="0" lang="en-US" sz="1600" b="0" i="0" u="none" strike="noStrike" kern="0" cap="none" spc="0" normalizeH="0" baseline="0" noProof="0" dirty="0">
               <a:ln>
                 <a:noFill/>
               </a:ln>
@@ -4771,12 +4787,12 @@
         </p:nvCxnSpPr>
         <p:spPr>
           <a:xfrm rot="10800000">
-            <a:off x="838200" y="4006334"/>
-            <a:ext cx="1444872" cy="2274332"/>
+            <a:off x="1686968" y="3499574"/>
+            <a:ext cx="1387722" cy="2274332"/>
           </a:xfrm>
           <a:prstGeom prst="bentConnector3">
             <a:avLst>
-              <a:gd name="adj1" fmla="val 115821"/>
+              <a:gd name="adj1" fmla="val 116473"/>
             </a:avLst>
           </a:prstGeom>
           <a:ln>
@@ -4808,7 +4824,7 @@
         </p:nvSpPr>
         <p:spPr>
           <a:xfrm>
-            <a:off x="3429000" y="4114800"/>
+            <a:off x="4277768" y="3608040"/>
             <a:ext cx="381000" cy="381000"/>
           </a:xfrm>
           <a:prstGeom prst="rect">
@@ -4871,7 +4887,7 @@
         </p:nvSpPr>
         <p:spPr>
           <a:xfrm>
-            <a:off x="2083776" y="5073108"/>
+            <a:off x="2932544" y="4566348"/>
             <a:ext cx="381000" cy="381000"/>
           </a:xfrm>
           <a:prstGeom prst="rect">
@@ -4934,7 +4950,7 @@
         </p:nvSpPr>
         <p:spPr>
           <a:xfrm>
-            <a:off x="1981200" y="6019800"/>
+            <a:off x="2829968" y="5513040"/>
             <a:ext cx="381000" cy="381000"/>
           </a:xfrm>
           <a:prstGeom prst="rect">
@@ -4997,7 +5013,7 @@
         </p:nvSpPr>
         <p:spPr>
           <a:xfrm>
-            <a:off x="914400" y="5943600"/>
+            <a:off x="1763168" y="5436840"/>
             <a:ext cx="1066800" cy="369332"/>
           </a:xfrm>
           <a:prstGeom prst="rect">
@@ -5060,7 +5076,7 @@
         </p:nvSpPr>
         <p:spPr>
           <a:xfrm>
-            <a:off x="1295400" y="4191000"/>
+            <a:off x="2144168" y="3684240"/>
             <a:ext cx="228600" cy="228600"/>
           </a:xfrm>
           <a:prstGeom prst="flowChartDecision">
@@ -5106,7 +5122,7 @@
         </p:nvSpPr>
         <p:spPr>
           <a:xfrm>
-            <a:off x="838200" y="621268"/>
+            <a:off x="1686968" y="386080"/>
             <a:ext cx="1143000" cy="369332"/>
           </a:xfrm>
           <a:prstGeom prst="rect">
@@ -5213,7 +5229,7 @@
         </p:nvSpPr>
         <p:spPr>
           <a:xfrm>
-            <a:off x="838200" y="990600"/>
+            <a:off x="1686968" y="755412"/>
             <a:ext cx="1143000" cy="369332"/>
           </a:xfrm>
           <a:prstGeom prst="rect">
@@ -5323,8 +5339,8 @@
         </p:nvCxnSpPr>
         <p:spPr>
           <a:xfrm rot="5400000" flipH="1" flipV="1">
-            <a:off x="1011198" y="1758434"/>
-            <a:ext cx="797004" cy="1588"/>
+            <a:off x="1995752" y="1387460"/>
+            <a:ext cx="525432" cy="12700"/>
           </a:xfrm>
           <a:prstGeom prst="bentConnector3">
             <a:avLst>
@@ -5349,7 +5365,7 @@
         </p:nvSpPr>
         <p:spPr>
           <a:xfrm>
-            <a:off x="6629400" y="3059668"/>
+            <a:off x="7478168" y="2552908"/>
             <a:ext cx="1143000" cy="369332"/>
           </a:xfrm>
           <a:prstGeom prst="rect">
@@ -5441,7 +5457,7 @@
         </p:nvCxnSpPr>
         <p:spPr>
           <a:xfrm rot="5400000">
-            <a:off x="4781550" y="2076450"/>
+            <a:off x="5630318" y="1569690"/>
             <a:ext cx="1066800" cy="3771900"/>
           </a:xfrm>
           <a:prstGeom prst="bentConnector2">
@@ -5476,7 +5492,7 @@
         </p:nvSpPr>
         <p:spPr>
           <a:xfrm>
-            <a:off x="2488224" y="5334000"/>
+            <a:off x="3319350" y="4739316"/>
             <a:ext cx="152400" cy="76200"/>
           </a:xfrm>
           <a:prstGeom prst="triangle">
@@ -5522,7 +5538,7 @@
         </p:nvCxnSpPr>
         <p:spPr>
           <a:xfrm rot="5400000" flipH="1" flipV="1">
-            <a:off x="2659702" y="5593402"/>
+            <a:off x="3508470" y="5086642"/>
             <a:ext cx="1002268" cy="2928"/>
           </a:xfrm>
           <a:prstGeom prst="bentConnector3">
@@ -5559,8 +5575,8 @@
         </p:nvSpPr>
         <p:spPr>
           <a:xfrm rot="16200000">
-            <a:off x="2867799" y="5438001"/>
-            <a:ext cx="882135" cy="369332"/>
+            <a:off x="3718393" y="4953908"/>
+            <a:ext cx="882135" cy="338554"/>
           </a:xfrm>
           <a:prstGeom prst="rect">
             <a:avLst/>
@@ -5591,7 +5607,7 @@
               <a:defRPr/>
             </a:pPr>
             <a:r>
-              <a:rPr kumimoji="0" lang="en-US" sz="1800" b="0" i="0" u="none" strike="noStrike" kern="0" cap="none" spc="0" normalizeH="0" baseline="0" noProof="0" dirty="0" smtClean="0">
+              <a:rPr kumimoji="0" lang="en-US" sz="1600" b="0" i="0" u="none" strike="noStrike" kern="0" cap="none" spc="0" normalizeH="0" baseline="0" noProof="0" dirty="0" smtClean="0">
                 <a:ln>
                   <a:noFill/>
                 </a:ln>
@@ -5600,9 +5616,9 @@
                 <a:uFillTx/>
                 <a:latin typeface="Calibri" pitchFamily="34" charset="0"/>
               </a:rPr>
-              <a:t>head in</a:t>
-            </a:r>
-            <a:endParaRPr kumimoji="0" lang="en-US" sz="1800" b="0" i="0" u="none" strike="noStrike" kern="0" cap="none" spc="0" normalizeH="0" baseline="0" noProof="0" dirty="0">
+              <a:t>ends in</a:t>
+            </a:r>
+            <a:endParaRPr kumimoji="0" lang="en-US" sz="1600" b="0" i="0" u="none" strike="noStrike" kern="0" cap="none" spc="0" normalizeH="0" baseline="0" noProof="0" dirty="0">
               <a:ln>
                 <a:noFill/>
               </a:ln>
@@ -5622,7 +5638,7 @@
         </p:nvSpPr>
         <p:spPr>
           <a:xfrm>
-            <a:off x="2878016" y="5055576"/>
+            <a:off x="3726784" y="4548816"/>
             <a:ext cx="381000" cy="381000"/>
           </a:xfrm>
           <a:prstGeom prst="rect">
@@ -5685,7 +5701,7 @@
         </p:nvSpPr>
         <p:spPr>
           <a:xfrm>
-            <a:off x="3250224" y="5181600"/>
+            <a:off x="4098992" y="4742900"/>
             <a:ext cx="152400" cy="76200"/>
           </a:xfrm>
           <a:prstGeom prst="triangle">
@@ -5731,7 +5747,7 @@
         </p:nvSpPr>
         <p:spPr>
           <a:xfrm>
-            <a:off x="4343400" y="4114800"/>
+            <a:off x="5192168" y="3608040"/>
             <a:ext cx="2057400" cy="369332"/>
           </a:xfrm>
           <a:prstGeom prst="rect">
@@ -5794,7 +5810,7 @@
         </p:nvSpPr>
         <p:spPr>
           <a:xfrm rot="16200000">
-            <a:off x="4278924" y="4287716"/>
+            <a:off x="5127692" y="3780956"/>
             <a:ext cx="152400" cy="76200"/>
           </a:xfrm>
           <a:prstGeom prst="triangle">
@@ -5840,7 +5856,7 @@
         </p:nvSpPr>
         <p:spPr>
           <a:xfrm rot="5400000">
-            <a:off x="6210300" y="2705100"/>
+            <a:off x="7059068" y="2198340"/>
             <a:ext cx="152400" cy="76200"/>
           </a:xfrm>
           <a:prstGeom prst="triangle">
@@ -5888,7 +5904,7 @@
         </p:nvCxnSpPr>
         <p:spPr>
           <a:xfrm rot="10800000" flipV="1">
-            <a:off x="3429000" y="3429000"/>
+            <a:off x="4277768" y="2922240"/>
             <a:ext cx="4114800" cy="1480066"/>
           </a:xfrm>
           <a:prstGeom prst="bentConnector3">
@@ -5925,7 +5941,7 @@
         </p:nvSpPr>
         <p:spPr>
           <a:xfrm>
-            <a:off x="4419600" y="4953000"/>
+            <a:off x="5268368" y="4446240"/>
             <a:ext cx="1600200" cy="369332"/>
           </a:xfrm>
           <a:prstGeom prst="rect">
@@ -5988,7 +6004,7 @@
         </p:nvSpPr>
         <p:spPr>
           <a:xfrm rot="16200000">
-            <a:off x="4305300" y="5125916"/>
+            <a:off x="5154068" y="4619156"/>
             <a:ext cx="152400" cy="76200"/>
           </a:xfrm>
           <a:prstGeom prst="triangle">
@@ -6034,7 +6050,7 @@
         </p:nvSpPr>
         <p:spPr>
           <a:xfrm rot="5400000">
-            <a:off x="1324708" y="6101860"/>
+            <a:off x="2173476" y="5595100"/>
             <a:ext cx="152400" cy="76200"/>
           </a:xfrm>
           <a:prstGeom prst="triangle">
@@ -6080,7 +6096,7 @@
         </p:nvSpPr>
         <p:spPr>
           <a:xfrm rot="10800000">
-            <a:off x="2569412" y="4191000"/>
+            <a:off x="3418180" y="3684240"/>
             <a:ext cx="152400" cy="76200"/>
           </a:xfrm>
           <a:prstGeom prst="triangle">
@@ -6126,7 +6142,7 @@
         </p:nvSpPr>
         <p:spPr>
           <a:xfrm rot="16200000">
-            <a:off x="3086100" y="2705100"/>
+            <a:off x="3934868" y="2198340"/>
             <a:ext cx="152400" cy="76200"/>
           </a:xfrm>
           <a:prstGeom prst="triangle">
@@ -6172,7 +6188,7 @@
         </p:nvSpPr>
         <p:spPr>
           <a:xfrm rot="16200000">
-            <a:off x="2781300" y="2095500"/>
+            <a:off x="3630068" y="1588740"/>
             <a:ext cx="152400" cy="76200"/>
           </a:xfrm>
           <a:prstGeom prst="triangle">
@@ -6218,7 +6234,7 @@
         </p:nvSpPr>
         <p:spPr>
           <a:xfrm rot="10800000">
-            <a:off x="1066800" y="3657600"/>
+            <a:off x="1915568" y="3150840"/>
             <a:ext cx="152400" cy="76200"/>
           </a:xfrm>
           <a:prstGeom prst="triangle">
@@ -6264,7 +6280,7 @@
         </p:nvSpPr>
         <p:spPr>
           <a:xfrm>
-            <a:off x="1371600" y="3429000"/>
+            <a:off x="2220368" y="2922240"/>
             <a:ext cx="381000" cy="381000"/>
           </a:xfrm>
           <a:prstGeom prst="rect">
@@ -6333,7 +6349,7 @@
         </p:nvSpPr>
         <p:spPr>
           <a:xfrm>
-            <a:off x="1447800" y="1371600"/>
+            <a:off x="2229542" y="1080681"/>
             <a:ext cx="381000" cy="381000"/>
           </a:xfrm>
           <a:prstGeom prst="rect">
@@ -6394,6 +6410,361 @@
           </a:p>
         </p:txBody>
       </p:sp>
+      <p:sp>
+        <p:nvSpPr>
+          <p:cNvPr id="58" name="Rectangle 57"/>
+          <p:cNvSpPr/>
+          <p:nvPr/>
+        </p:nvSpPr>
+        <p:spPr>
+          <a:xfrm>
+            <a:off x="5191373" y="2544667"/>
+            <a:ext cx="1143000" cy="646331"/>
+          </a:xfrm>
+          <a:prstGeom prst="rect">
+            <a:avLst/>
+          </a:prstGeom>
+          <a:solidFill>
+            <a:srgbClr val="8064A2">
+              <a:tint val="50000"/>
+              <a:satMod val="300000"/>
+            </a:srgbClr>
+          </a:solidFill>
+          <a:ln w="9525" cap="flat" cmpd="sng" algn="ctr">
+            <a:solidFill>
+              <a:srgbClr val="8064A2">
+                <a:shade val="95000"/>
+                <a:satMod val="105000"/>
+              </a:srgbClr>
+            </a:solidFill>
+            <a:prstDash val="solid"/>
+          </a:ln>
+          <a:effectLst>
+            <a:outerShdw blurRad="40000" dist="20000" dir="5400000" rotWithShape="0">
+              <a:srgbClr val="000000">
+                <a:alpha val="38000"/>
+              </a:srgbClr>
+            </a:outerShdw>
+          </a:effectLst>
+        </p:spPr>
+        <p:txBody>
+          <a:bodyPr wrap="square" rtlCol="0" anchor="ctr">
+            <a:spAutoFit/>
+          </a:bodyPr>
+          <a:lstStyle/>
+          <a:p>
+            <a:pPr>
+              <a:defRPr/>
+            </a:pPr>
+            <a:r>
+              <a:rPr lang="en-US" kern="0" dirty="0" smtClean="0">
+                <a:solidFill>
+                  <a:sysClr val="windowText" lastClr="000000"/>
+                </a:solidFill>
+              </a:rPr>
+              <a:t>name</a:t>
+            </a:r>
+          </a:p>
+          <a:p>
+            <a:pPr>
+              <a:defRPr/>
+            </a:pPr>
+            <a:r>
+              <a:rPr lang="en-US" kern="0" dirty="0" smtClean="0">
+                <a:solidFill>
+                  <a:sysClr val="windowText" lastClr="000000"/>
+                </a:solidFill>
+              </a:rPr>
+              <a:t>id</a:t>
+            </a:r>
+            <a:endParaRPr lang="en-US" kern="0" dirty="0">
+              <a:solidFill>
+                <a:sysClr val="windowText" lastClr="000000"/>
+              </a:solidFill>
+            </a:endParaRPr>
+          </a:p>
+        </p:txBody>
+      </p:sp>
+      <p:sp>
+        <p:nvSpPr>
+          <p:cNvPr id="59" name="Rectangle 58"/>
+          <p:cNvSpPr/>
+          <p:nvPr/>
+        </p:nvSpPr>
+        <p:spPr>
+          <a:xfrm>
+            <a:off x="5020718" y="5115933"/>
+            <a:ext cx="1143000" cy="369332"/>
+          </a:xfrm>
+          <a:prstGeom prst="rect">
+            <a:avLst/>
+          </a:prstGeom>
+          <a:gradFill rotWithShape="1">
+            <a:gsLst>
+              <a:gs pos="0">
+                <a:srgbClr val="4F81BD">
+                  <a:tint val="50000"/>
+                  <a:satMod val="300000"/>
+                </a:srgbClr>
+              </a:gs>
+              <a:gs pos="35000">
+                <a:srgbClr val="4F81BD">
+                  <a:tint val="37000"/>
+                  <a:satMod val="300000"/>
+                </a:srgbClr>
+              </a:gs>
+              <a:gs pos="100000">
+                <a:srgbClr val="4F81BD">
+                  <a:tint val="15000"/>
+                  <a:satMod val="350000"/>
+                </a:srgbClr>
+              </a:gs>
+            </a:gsLst>
+            <a:lin ang="16200000" scaled="1"/>
+          </a:gradFill>
+          <a:ln w="9525" cap="flat" cmpd="sng" algn="ctr">
+            <a:solidFill>
+              <a:srgbClr val="4F81BD">
+                <a:shade val="95000"/>
+                <a:satMod val="105000"/>
+              </a:srgbClr>
+            </a:solidFill>
+            <a:prstDash val="solid"/>
+          </a:ln>
+          <a:effectLst>
+            <a:outerShdw blurRad="40000" dist="20000" dir="5400000" rotWithShape="0">
+              <a:srgbClr val="000000">
+                <a:alpha val="38000"/>
+              </a:srgbClr>
+            </a:outerShdw>
+          </a:effectLst>
+        </p:spPr>
+        <p:txBody>
+          <a:bodyPr wrap="square" rtlCol="0" anchor="ctr">
+            <a:spAutoFit/>
+          </a:bodyPr>
+          <a:lstStyle/>
+          <a:p>
+            <a:pPr algn="ctr">
+              <a:defRPr/>
+            </a:pPr>
+            <a:r>
+              <a:rPr lang="en-US" kern="0" dirty="0" smtClean="0">
+                <a:solidFill>
+                  <a:sysClr val="windowText" lastClr="000000"/>
+                </a:solidFill>
+                <a:latin typeface="Calibri" pitchFamily="34" charset="0"/>
+              </a:rPr>
+              <a:t>Snake</a:t>
+            </a:r>
+            <a:endParaRPr lang="en-US" kern="0" dirty="0">
+              <a:solidFill>
+                <a:sysClr val="windowText" lastClr="000000"/>
+              </a:solidFill>
+              <a:latin typeface="Calibri" pitchFamily="34" charset="0"/>
+            </a:endParaRPr>
+          </a:p>
+        </p:txBody>
+      </p:sp>
+      <p:sp>
+        <p:nvSpPr>
+          <p:cNvPr id="60" name="Rectangle 59"/>
+          <p:cNvSpPr/>
+          <p:nvPr/>
+        </p:nvSpPr>
+        <p:spPr>
+          <a:xfrm>
+            <a:off x="5022593" y="5829560"/>
+            <a:ext cx="1143000" cy="369332"/>
+          </a:xfrm>
+          <a:prstGeom prst="rect">
+            <a:avLst/>
+          </a:prstGeom>
+          <a:gradFill rotWithShape="1">
+            <a:gsLst>
+              <a:gs pos="0">
+                <a:srgbClr val="4F81BD">
+                  <a:tint val="50000"/>
+                  <a:satMod val="300000"/>
+                </a:srgbClr>
+              </a:gs>
+              <a:gs pos="35000">
+                <a:srgbClr val="4F81BD">
+                  <a:tint val="37000"/>
+                  <a:satMod val="300000"/>
+                </a:srgbClr>
+              </a:gs>
+              <a:gs pos="100000">
+                <a:srgbClr val="4F81BD">
+                  <a:tint val="15000"/>
+                  <a:satMod val="350000"/>
+                </a:srgbClr>
+              </a:gs>
+            </a:gsLst>
+            <a:lin ang="16200000" scaled="1"/>
+          </a:gradFill>
+          <a:ln w="9525" cap="flat" cmpd="sng" algn="ctr">
+            <a:solidFill>
+              <a:srgbClr val="4F81BD">
+                <a:shade val="95000"/>
+                <a:satMod val="105000"/>
+              </a:srgbClr>
+            </a:solidFill>
+            <a:prstDash val="solid"/>
+          </a:ln>
+          <a:effectLst>
+            <a:outerShdw blurRad="40000" dist="20000" dir="5400000" rotWithShape="0">
+              <a:srgbClr val="000000">
+                <a:alpha val="38000"/>
+              </a:srgbClr>
+            </a:outerShdw>
+          </a:effectLst>
+        </p:spPr>
+        <p:txBody>
+          <a:bodyPr wrap="square" rtlCol="0" anchor="ctr">
+            <a:spAutoFit/>
+          </a:bodyPr>
+          <a:lstStyle/>
+          <a:p>
+            <a:pPr algn="ctr">
+              <a:defRPr/>
+            </a:pPr>
+            <a:r>
+              <a:rPr lang="en-US" kern="0" dirty="0" smtClean="0">
+                <a:solidFill>
+                  <a:sysClr val="windowText" lastClr="000000"/>
+                </a:solidFill>
+                <a:latin typeface="Calibri" pitchFamily="34" charset="0"/>
+              </a:rPr>
+              <a:t>Ladder</a:t>
+            </a:r>
+            <a:endParaRPr lang="en-US" kern="0" dirty="0">
+              <a:solidFill>
+                <a:sysClr val="windowText" lastClr="000000"/>
+              </a:solidFill>
+              <a:latin typeface="Calibri" pitchFamily="34" charset="0"/>
+            </a:endParaRPr>
+          </a:p>
+        </p:txBody>
+      </p:sp>
+      <p:sp>
+        <p:nvSpPr>
+          <p:cNvPr id="2" name="Isosceles Triangle 1"/>
+          <p:cNvSpPr/>
+          <p:nvPr/>
+        </p:nvSpPr>
+        <p:spPr>
+          <a:xfrm rot="16200000">
+            <a:off x="4326443" y="5650383"/>
+            <a:ext cx="228600" cy="212493"/>
+          </a:xfrm>
+          <a:prstGeom prst="triangle">
+            <a:avLst/>
+          </a:prstGeom>
+        </p:spPr>
+        <p:style>
+          <a:lnRef idx="1">
+            <a:schemeClr val="accent1"/>
+          </a:lnRef>
+          <a:fillRef idx="2">
+            <a:schemeClr val="accent1"/>
+          </a:fillRef>
+          <a:effectRef idx="1">
+            <a:schemeClr val="accent1"/>
+          </a:effectRef>
+          <a:fontRef idx="minor">
+            <a:schemeClr val="dk1"/>
+          </a:fontRef>
+        </p:style>
+        <p:txBody>
+          <a:bodyPr rtlCol="0" anchor="ctr"/>
+          <a:lstStyle/>
+          <a:p>
+            <a:pPr algn="ctr"/>
+            <a:endParaRPr lang="en-US"/>
+          </a:p>
+        </p:txBody>
+      </p:sp>
+      <p:cxnSp>
+        <p:nvCxnSpPr>
+          <p:cNvPr id="61" name="Shape 52"/>
+          <p:cNvCxnSpPr>
+            <a:stCxn id="60" idx="1"/>
+            <a:endCxn id="2" idx="3"/>
+          </p:cNvCxnSpPr>
+          <p:nvPr/>
+        </p:nvCxnSpPr>
+        <p:spPr>
+          <a:xfrm rot="10800000">
+            <a:off x="4546991" y="5756630"/>
+            <a:ext cx="475603" cy="257596"/>
+          </a:xfrm>
+          <a:prstGeom prst="bentConnector3">
+            <a:avLst>
+              <a:gd name="adj1" fmla="val 50000"/>
+            </a:avLst>
+          </a:prstGeom>
+          <a:ln>
+            <a:solidFill>
+              <a:schemeClr val="tx1"/>
+            </a:solidFill>
+          </a:ln>
+        </p:spPr>
+        <p:style>
+          <a:lnRef idx="1">
+            <a:schemeClr val="accent1"/>
+          </a:lnRef>
+          <a:fillRef idx="0">
+            <a:schemeClr val="accent1"/>
+          </a:fillRef>
+          <a:effectRef idx="0">
+            <a:schemeClr val="accent1"/>
+          </a:effectRef>
+          <a:fontRef idx="minor">
+            <a:schemeClr val="tx1"/>
+          </a:fontRef>
+        </p:style>
+      </p:cxnSp>
+      <p:cxnSp>
+        <p:nvCxnSpPr>
+          <p:cNvPr id="66" name="Shape 52"/>
+          <p:cNvCxnSpPr>
+            <a:stCxn id="59" idx="1"/>
+            <a:endCxn id="2" idx="3"/>
+          </p:cNvCxnSpPr>
+          <p:nvPr/>
+        </p:nvCxnSpPr>
+        <p:spPr>
+          <a:xfrm rot="10800000" flipV="1">
+            <a:off x="4546990" y="5300598"/>
+            <a:ext cx="473728" cy="456031"/>
+          </a:xfrm>
+          <a:prstGeom prst="bentConnector3">
+            <a:avLst>
+              <a:gd name="adj1" fmla="val 50000"/>
+            </a:avLst>
+          </a:prstGeom>
+          <a:ln>
+            <a:solidFill>
+              <a:schemeClr val="tx1"/>
+            </a:solidFill>
+          </a:ln>
+        </p:spPr>
+        <p:style>
+          <a:lnRef idx="1">
+            <a:schemeClr val="accent1"/>
+          </a:lnRef>
+          <a:fillRef idx="0">
+            <a:schemeClr val="accent1"/>
+          </a:fillRef>
+          <a:effectRef idx="0">
+            <a:schemeClr val="accent1"/>
+          </a:effectRef>
+          <a:fontRef idx="minor">
+            <a:schemeClr val="tx1"/>
+          </a:fontRef>
+        </p:style>
+      </p:cxnSp>
     </p:spTree>
     <p:extLst>
       <p:ext uri="{BB962C8B-B14F-4D97-AF65-F5344CB8AC3E}">

</xml_diff>